<commit_message>
add new ppt file
</commit_message>
<xml_diff>
--- a/session1/git.pptx
+++ b/session1/git.pptx
@@ -282,7 +282,7 @@
           <a:p>
             <a:fld id="{B2B9A579-241C-417C-A496-F98C5C71B1F2}" type="datetimeFigureOut">
               <a:rPr lang="en-US" smtClean="0"/>
-              <a:t>11/17/2017</a:t>
+              <a:t>3/1/2019</a:t>
             </a:fld>
             <a:endParaRPr lang="en-US"/>
           </a:p>
@@ -480,7 +480,7 @@
           <a:p>
             <a:fld id="{B2B9A579-241C-417C-A496-F98C5C71B1F2}" type="datetimeFigureOut">
               <a:rPr lang="en-US" smtClean="0"/>
-              <a:t>11/17/2017</a:t>
+              <a:t>3/1/2019</a:t>
             </a:fld>
             <a:endParaRPr lang="en-US"/>
           </a:p>
@@ -688,7 +688,7 @@
           <a:p>
             <a:fld id="{B2B9A579-241C-417C-A496-F98C5C71B1F2}" type="datetimeFigureOut">
               <a:rPr lang="en-US" smtClean="0"/>
-              <a:t>11/17/2017</a:t>
+              <a:t>3/1/2019</a:t>
             </a:fld>
             <a:endParaRPr lang="en-US"/>
           </a:p>
@@ -886,7 +886,7 @@
           <a:p>
             <a:fld id="{B2B9A579-241C-417C-A496-F98C5C71B1F2}" type="datetimeFigureOut">
               <a:rPr lang="en-US" smtClean="0"/>
-              <a:t>11/17/2017</a:t>
+              <a:t>3/1/2019</a:t>
             </a:fld>
             <a:endParaRPr lang="en-US"/>
           </a:p>
@@ -1161,7 +1161,7 @@
           <a:p>
             <a:fld id="{B2B9A579-241C-417C-A496-F98C5C71B1F2}" type="datetimeFigureOut">
               <a:rPr lang="en-US" smtClean="0"/>
-              <a:t>11/17/2017</a:t>
+              <a:t>3/1/2019</a:t>
             </a:fld>
             <a:endParaRPr lang="en-US"/>
           </a:p>
@@ -1426,7 +1426,7 @@
           <a:p>
             <a:fld id="{B2B9A579-241C-417C-A496-F98C5C71B1F2}" type="datetimeFigureOut">
               <a:rPr lang="en-US" smtClean="0"/>
-              <a:t>11/17/2017</a:t>
+              <a:t>3/1/2019</a:t>
             </a:fld>
             <a:endParaRPr lang="en-US"/>
           </a:p>
@@ -1838,7 +1838,7 @@
           <a:p>
             <a:fld id="{B2B9A579-241C-417C-A496-F98C5C71B1F2}" type="datetimeFigureOut">
               <a:rPr lang="en-US" smtClean="0"/>
-              <a:t>11/17/2017</a:t>
+              <a:t>3/1/2019</a:t>
             </a:fld>
             <a:endParaRPr lang="en-US"/>
           </a:p>
@@ -1979,7 +1979,7 @@
           <a:p>
             <a:fld id="{B2B9A579-241C-417C-A496-F98C5C71B1F2}" type="datetimeFigureOut">
               <a:rPr lang="en-US" smtClean="0"/>
-              <a:t>11/17/2017</a:t>
+              <a:t>3/1/2019</a:t>
             </a:fld>
             <a:endParaRPr lang="en-US"/>
           </a:p>
@@ -2092,7 +2092,7 @@
           <a:p>
             <a:fld id="{B2B9A579-241C-417C-A496-F98C5C71B1F2}" type="datetimeFigureOut">
               <a:rPr lang="en-US" smtClean="0"/>
-              <a:t>11/17/2017</a:t>
+              <a:t>3/1/2019</a:t>
             </a:fld>
             <a:endParaRPr lang="en-US"/>
           </a:p>
@@ -2403,7 +2403,7 @@
           <a:p>
             <a:fld id="{B2B9A579-241C-417C-A496-F98C5C71B1F2}" type="datetimeFigureOut">
               <a:rPr lang="en-US" smtClean="0"/>
-              <a:t>11/17/2017</a:t>
+              <a:t>3/1/2019</a:t>
             </a:fld>
             <a:endParaRPr lang="en-US"/>
           </a:p>
@@ -2691,7 +2691,7 @@
           <a:p>
             <a:fld id="{B2B9A579-241C-417C-A496-F98C5C71B1F2}" type="datetimeFigureOut">
               <a:rPr lang="en-US" smtClean="0"/>
-              <a:t>11/17/2017</a:t>
+              <a:t>3/1/2019</a:t>
             </a:fld>
             <a:endParaRPr lang="en-US"/>
           </a:p>
@@ -2932,7 +2932,7 @@
           <a:p>
             <a:fld id="{B2B9A579-241C-417C-A496-F98C5C71B1F2}" type="datetimeFigureOut">
               <a:rPr lang="en-US" smtClean="0"/>
-              <a:t>11/17/2017</a:t>
+              <a:t>3/1/2019</a:t>
             </a:fld>
             <a:endParaRPr lang="en-US"/>
           </a:p>
@@ -3385,43 +3385,6 @@
           </a:prstGeom>
         </p:spPr>
       </p:pic>
-      <p:sp>
-        <p:nvSpPr>
-          <p:cNvPr id="5" name="Rectangle 4">
-            <a:extLst>
-              <a:ext uri="{FF2B5EF4-FFF2-40B4-BE49-F238E27FC236}">
-                <a16:creationId xmlns:a16="http://schemas.microsoft.com/office/drawing/2014/main" id="{F858D403-51C8-4167-97F1-56B92D2ECF4D}"/>
-              </a:ext>
-            </a:extLst>
-          </p:cNvPr>
-          <p:cNvSpPr/>
-          <p:nvPr/>
-        </p:nvSpPr>
-        <p:spPr>
-          <a:xfrm>
-            <a:off x="4601036" y="4197921"/>
-            <a:ext cx="2989921" cy="369332"/>
-          </a:xfrm>
-          <a:prstGeom prst="rect">
-            <a:avLst/>
-          </a:prstGeom>
-        </p:spPr>
-        <p:txBody>
-          <a:bodyPr wrap="none">
-            <a:spAutoFit/>
-          </a:bodyPr>
-          <a:lstStyle/>
-          <a:p>
-            <a:r>
-              <a:rPr lang="en-US" dirty="0">
-                <a:latin typeface="Moire Light" panose="02000304030000020004" pitchFamily="2" charset="0"/>
-                <a:ea typeface="Yu Gothic UI Semibold" panose="020B0700000000000000" pitchFamily="34" charset="-128"/>
-              </a:rPr>
-              <a:t>Lecturer  :  Reza Arjmandi</a:t>
-            </a:r>
-          </a:p>
-        </p:txBody>
-      </p:sp>
     </p:spTree>
     <p:extLst>
       <p:ext uri="{BB962C8B-B14F-4D97-AF65-F5344CB8AC3E}">
@@ -3571,7 +3534,7 @@
           <p:nvPr/>
         </p:nvPicPr>
         <p:blipFill>
-          <a:blip r:embed="rId2">
+          <a:blip r:embed="rId2" cstate="hqprint">
             <a:extLst>
               <a:ext uri="{28A0092B-C50C-407E-A947-70E740481C1C}">
                 <a14:useLocalDpi xmlns:a14="http://schemas.microsoft.com/office/drawing/2010/main" val="0"/>
@@ -3845,7 +3808,7 @@
           <p:nvPr/>
         </p:nvPicPr>
         <p:blipFill>
-          <a:blip r:embed="rId2">
+          <a:blip r:embed="rId2" cstate="hqprint">
             <a:extLst>
               <a:ext uri="{28A0092B-C50C-407E-A947-70E740481C1C}">
                 <a14:useLocalDpi xmlns:a14="http://schemas.microsoft.com/office/drawing/2010/main" val="0"/>
@@ -4419,7 +4382,7 @@
           <p:nvPr/>
         </p:nvPicPr>
         <p:blipFill>
-          <a:blip r:embed="rId2">
+          <a:blip r:embed="rId2" cstate="hqprint">
             <a:extLst>
               <a:ext uri="{28A0092B-C50C-407E-A947-70E740481C1C}">
                 <a14:useLocalDpi xmlns:a14="http://schemas.microsoft.com/office/drawing/2010/main" val="0"/>
@@ -5052,7 +5015,7 @@
           <p:nvPr/>
         </p:nvPicPr>
         <p:blipFill>
-          <a:blip r:embed="rId3">
+          <a:blip r:embed="rId3" cstate="hqprint">
             <a:extLst>
               <a:ext uri="{28A0092B-C50C-407E-A947-70E740481C1C}">
                 <a14:useLocalDpi xmlns:a14="http://schemas.microsoft.com/office/drawing/2010/main" val="0"/>
@@ -5268,7 +5231,7 @@
           <p:nvPr/>
         </p:nvPicPr>
         <p:blipFill>
-          <a:blip r:embed="rId2">
+          <a:blip r:embed="rId2" cstate="hqprint">
             <a:extLst>
               <a:ext uri="{28A0092B-C50C-407E-A947-70E740481C1C}">
                 <a14:useLocalDpi xmlns:a14="http://schemas.microsoft.com/office/drawing/2010/main" val="0"/>
@@ -5894,7 +5857,7 @@
           <p:nvPr/>
         </p:nvPicPr>
         <p:blipFill>
-          <a:blip r:embed="rId2">
+          <a:blip r:embed="rId2" cstate="hqprint">
             <a:extLst>
               <a:ext uri="{28A0092B-C50C-407E-A947-70E740481C1C}">
                 <a14:useLocalDpi xmlns:a14="http://schemas.microsoft.com/office/drawing/2010/main" val="0"/>
@@ -6205,7 +6168,7 @@
           <p:nvPr/>
         </p:nvPicPr>
         <p:blipFill>
-          <a:blip r:embed="rId2">
+          <a:blip r:embed="rId2" cstate="hqprint">
             <a:extLst>
               <a:ext uri="{28A0092B-C50C-407E-A947-70E740481C1C}">
                 <a14:useLocalDpi xmlns:a14="http://schemas.microsoft.com/office/drawing/2010/main" val="0"/>
@@ -6516,7 +6479,7 @@
           <p:nvPr/>
         </p:nvPicPr>
         <p:blipFill>
-          <a:blip r:embed="rId2">
+          <a:blip r:embed="rId2" cstate="hqprint">
             <a:extLst>
               <a:ext uri="{28A0092B-C50C-407E-A947-70E740481C1C}">
                 <a14:useLocalDpi xmlns:a14="http://schemas.microsoft.com/office/drawing/2010/main" val="0"/>
@@ -7079,7 +7042,7 @@
           <p:nvPr/>
         </p:nvPicPr>
         <p:blipFill>
-          <a:blip r:embed="rId3">
+          <a:blip r:embed="rId3" cstate="hqprint">
             <a:extLst>
               <a:ext uri="{28A0092B-C50C-407E-A947-70E740481C1C}">
                 <a14:useLocalDpi xmlns:a14="http://schemas.microsoft.com/office/drawing/2010/main" val="0"/>
@@ -7298,7 +7261,7 @@
           <p:nvPr/>
         </p:nvPicPr>
         <p:blipFill>
-          <a:blip r:embed="rId2">
+          <a:blip r:embed="rId2" cstate="hqprint">
             <a:extLst>
               <a:ext uri="{28A0092B-C50C-407E-A947-70E740481C1C}">
                 <a14:useLocalDpi xmlns:a14="http://schemas.microsoft.com/office/drawing/2010/main" val="0"/>
@@ -7523,7 +7486,7 @@
           <p:nvPr/>
         </p:nvPicPr>
         <p:blipFill>
-          <a:blip r:embed="rId3">
+          <a:blip r:embed="rId3" cstate="hqprint">
             <a:extLst>
               <a:ext uri="{28A0092B-C50C-407E-A947-70E740481C1C}">
                 <a14:useLocalDpi xmlns:a14="http://schemas.microsoft.com/office/drawing/2010/main" val="0"/>
@@ -7714,7 +7677,7 @@
           <p:nvPr/>
         </p:nvPicPr>
         <p:blipFill>
-          <a:blip r:embed="rId2">
+          <a:blip r:embed="rId2" cstate="hqprint">
             <a:extLst>
               <a:ext uri="{28A0092B-C50C-407E-A947-70E740481C1C}">
                 <a14:useLocalDpi xmlns:a14="http://schemas.microsoft.com/office/drawing/2010/main" val="0"/>
@@ -8070,7 +8033,7 @@
           <p:nvPr/>
         </p:nvPicPr>
         <p:blipFill>
-          <a:blip r:embed="rId2">
+          <a:blip r:embed="rId2" cstate="hqprint">
             <a:extLst>
               <a:ext uri="{28A0092B-C50C-407E-A947-70E740481C1C}">
                 <a14:useLocalDpi xmlns:a14="http://schemas.microsoft.com/office/drawing/2010/main" val="0"/>
@@ -8321,7 +8284,7 @@
           <p:nvPr/>
         </p:nvPicPr>
         <p:blipFill>
-          <a:blip r:embed="rId3">
+          <a:blip r:embed="rId3" cstate="hqprint">
             <a:extLst>
               <a:ext uri="{28A0092B-C50C-407E-A947-70E740481C1C}">
                 <a14:useLocalDpi xmlns:a14="http://schemas.microsoft.com/office/drawing/2010/main" val="0"/>
@@ -8557,7 +8520,7 @@
           <p:nvPr/>
         </p:nvPicPr>
         <p:blipFill>
-          <a:blip r:embed="rId3">
+          <a:blip r:embed="rId3" cstate="hqprint">
             <a:extLst>
               <a:ext uri="{28A0092B-C50C-407E-A947-70E740481C1C}">
                 <a14:useLocalDpi xmlns:a14="http://schemas.microsoft.com/office/drawing/2010/main" val="0"/>
@@ -8788,7 +8751,7 @@
           <p:nvPr/>
         </p:nvPicPr>
         <p:blipFill>
-          <a:blip r:embed="rId2">
+          <a:blip r:embed="rId2" cstate="hqprint">
             <a:extLst>
               <a:ext uri="{28A0092B-C50C-407E-A947-70E740481C1C}">
                 <a14:useLocalDpi xmlns:a14="http://schemas.microsoft.com/office/drawing/2010/main" val="0"/>
@@ -9066,7 +9029,7 @@
           <p:nvPr/>
         </p:nvPicPr>
         <p:blipFill>
-          <a:blip r:embed="rId2">
+          <a:blip r:embed="rId2" cstate="hqprint">
             <a:extLst>
               <a:ext uri="{28A0092B-C50C-407E-A947-70E740481C1C}">
                 <a14:useLocalDpi xmlns:a14="http://schemas.microsoft.com/office/drawing/2010/main" val="0"/>
@@ -9382,7 +9345,7 @@
           <p:nvPr/>
         </p:nvPicPr>
         <p:blipFill>
-          <a:blip r:embed="rId3">
+          <a:blip r:embed="rId3" cstate="hqprint">
             <a:extLst>
               <a:ext uri="{28A0092B-C50C-407E-A947-70E740481C1C}">
                 <a14:useLocalDpi xmlns:a14="http://schemas.microsoft.com/office/drawing/2010/main" val="0"/>
@@ -9731,7 +9694,7 @@
           <p:nvPr/>
         </p:nvPicPr>
         <p:blipFill>
-          <a:blip r:embed="rId2">
+          <a:blip r:embed="rId2" cstate="hqprint">
             <a:extLst>
               <a:ext uri="{28A0092B-C50C-407E-A947-70E740481C1C}">
                 <a14:useLocalDpi xmlns:a14="http://schemas.microsoft.com/office/drawing/2010/main" val="0"/>

</xml_diff>